<commit_message>
fixed commenting based indent bugs
</commit_message>
<xml_diff>
--- a/FYP Presentation.pptx
+++ b/FYP Presentation.pptx
@@ -268,7 +268,7 @@
           <a:p>
             <a:fld id="{A7E93B79-5F87-463F-BE54-B700F7D9A626}" type="datetimeFigureOut">
               <a:rPr lang="en-GB" smtClean="0"/>
-              <a:t>14/06/2022</a:t>
+              <a:t>15/06/2022</a:t>
             </a:fld>
             <a:endParaRPr lang="en-GB"/>
           </a:p>
@@ -468,7 +468,7 @@
           <a:p>
             <a:fld id="{A7E93B79-5F87-463F-BE54-B700F7D9A626}" type="datetimeFigureOut">
               <a:rPr lang="en-GB" smtClean="0"/>
-              <a:t>14/06/2022</a:t>
+              <a:t>15/06/2022</a:t>
             </a:fld>
             <a:endParaRPr lang="en-GB"/>
           </a:p>
@@ -678,7 +678,7 @@
           <a:p>
             <a:fld id="{A7E93B79-5F87-463F-BE54-B700F7D9A626}" type="datetimeFigureOut">
               <a:rPr lang="en-GB" smtClean="0"/>
-              <a:t>14/06/2022</a:t>
+              <a:t>15/06/2022</a:t>
             </a:fld>
             <a:endParaRPr lang="en-GB"/>
           </a:p>
@@ -878,7 +878,7 @@
           <a:p>
             <a:fld id="{A7E93B79-5F87-463F-BE54-B700F7D9A626}" type="datetimeFigureOut">
               <a:rPr lang="en-GB" smtClean="0"/>
-              <a:t>14/06/2022</a:t>
+              <a:t>15/06/2022</a:t>
             </a:fld>
             <a:endParaRPr lang="en-GB"/>
           </a:p>
@@ -1154,7 +1154,7 @@
           <a:p>
             <a:fld id="{A7E93B79-5F87-463F-BE54-B700F7D9A626}" type="datetimeFigureOut">
               <a:rPr lang="en-GB" smtClean="0"/>
-              <a:t>14/06/2022</a:t>
+              <a:t>15/06/2022</a:t>
             </a:fld>
             <a:endParaRPr lang="en-GB"/>
           </a:p>
@@ -1422,7 +1422,7 @@
           <a:p>
             <a:fld id="{A7E93B79-5F87-463F-BE54-B700F7D9A626}" type="datetimeFigureOut">
               <a:rPr lang="en-GB" smtClean="0"/>
-              <a:t>14/06/2022</a:t>
+              <a:t>15/06/2022</a:t>
             </a:fld>
             <a:endParaRPr lang="en-GB"/>
           </a:p>
@@ -1837,7 +1837,7 @@
           <a:p>
             <a:fld id="{A7E93B79-5F87-463F-BE54-B700F7D9A626}" type="datetimeFigureOut">
               <a:rPr lang="en-GB" smtClean="0"/>
-              <a:t>14/06/2022</a:t>
+              <a:t>15/06/2022</a:t>
             </a:fld>
             <a:endParaRPr lang="en-GB"/>
           </a:p>
@@ -1979,7 +1979,7 @@
           <a:p>
             <a:fld id="{A7E93B79-5F87-463F-BE54-B700F7D9A626}" type="datetimeFigureOut">
               <a:rPr lang="en-GB" smtClean="0"/>
-              <a:t>14/06/2022</a:t>
+              <a:t>15/06/2022</a:t>
             </a:fld>
             <a:endParaRPr lang="en-GB"/>
           </a:p>
@@ -2092,7 +2092,7 @@
           <a:p>
             <a:fld id="{A7E93B79-5F87-463F-BE54-B700F7D9A626}" type="datetimeFigureOut">
               <a:rPr lang="en-GB" smtClean="0"/>
-              <a:t>14/06/2022</a:t>
+              <a:t>15/06/2022</a:t>
             </a:fld>
             <a:endParaRPr lang="en-GB"/>
           </a:p>
@@ -2405,7 +2405,7 @@
           <a:p>
             <a:fld id="{A7E93B79-5F87-463F-BE54-B700F7D9A626}" type="datetimeFigureOut">
               <a:rPr lang="en-GB" smtClean="0"/>
-              <a:t>14/06/2022</a:t>
+              <a:t>15/06/2022</a:t>
             </a:fld>
             <a:endParaRPr lang="en-GB"/>
           </a:p>
@@ -2694,7 +2694,7 @@
           <a:p>
             <a:fld id="{A7E93B79-5F87-463F-BE54-B700F7D9A626}" type="datetimeFigureOut">
               <a:rPr lang="en-GB" smtClean="0"/>
-              <a:t>14/06/2022</a:t>
+              <a:t>15/06/2022</a:t>
             </a:fld>
             <a:endParaRPr lang="en-GB"/>
           </a:p>
@@ -2937,7 +2937,7 @@
           <a:p>
             <a:fld id="{A7E93B79-5F87-463F-BE54-B700F7D9A626}" type="datetimeFigureOut">
               <a:rPr lang="en-GB" smtClean="0"/>
-              <a:t>14/06/2022</a:t>
+              <a:t>15/06/2022</a:t>
             </a:fld>
             <a:endParaRPr lang="en-GB"/>
           </a:p>
@@ -3673,7 +3673,10 @@
           <a:bodyPr/>
           <a:lstStyle/>
           <a:p>
-            <a:endParaRPr lang="en-GB" dirty="0"/>
+            <a:r>
+              <a:rPr lang="en-GB" dirty="0"/>
+              <a:t>REMEMBERWEIGHT DECAY == 0. FIND A REASON WHY</a:t>
+            </a:r>
           </a:p>
         </p:txBody>
       </p:sp>

</xml_diff>

<commit_message>
update presentation + add report
</commit_message>
<xml_diff>
--- a/FYP Presentation.pptx
+++ b/FYP Presentation.pptx
@@ -5,7 +5,7 @@
     <p:sldMasterId id="2147483648" r:id="rId1"/>
   </p:sldMasterIdLst>
   <p:notesMasterIdLst>
-    <p:notesMasterId r:id="rId12"/>
+    <p:notesMasterId r:id="rId22"/>
   </p:notesMasterIdLst>
   <p:sldIdLst>
     <p:sldId id="264" r:id="rId2"/>
@@ -13,11 +13,21 @@
     <p:sldId id="257" r:id="rId4"/>
     <p:sldId id="258" r:id="rId5"/>
     <p:sldId id="265" r:id="rId6"/>
-    <p:sldId id="259" r:id="rId7"/>
-    <p:sldId id="260" r:id="rId8"/>
-    <p:sldId id="261" r:id="rId9"/>
-    <p:sldId id="262" r:id="rId10"/>
-    <p:sldId id="263" r:id="rId11"/>
+    <p:sldId id="266" r:id="rId7"/>
+    <p:sldId id="267" r:id="rId8"/>
+    <p:sldId id="268" r:id="rId9"/>
+    <p:sldId id="269" r:id="rId10"/>
+    <p:sldId id="270" r:id="rId11"/>
+    <p:sldId id="271" r:id="rId12"/>
+    <p:sldId id="272" r:id="rId13"/>
+    <p:sldId id="273" r:id="rId14"/>
+    <p:sldId id="274" r:id="rId15"/>
+    <p:sldId id="275" r:id="rId16"/>
+    <p:sldId id="277" r:id="rId17"/>
+    <p:sldId id="276" r:id="rId18"/>
+    <p:sldId id="278" r:id="rId19"/>
+    <p:sldId id="259" r:id="rId20"/>
+    <p:sldId id="260" r:id="rId21"/>
   </p:sldIdLst>
   <p:sldSz cx="12192000" cy="6858000"/>
   <p:notesSz cx="6858000" cy="9144000"/>
@@ -206,7 +216,7 @@
           <a:p>
             <a:fld id="{3E8EE9C8-0F55-4C1F-A577-BB7912626A21}" type="datetimeFigureOut">
               <a:rPr lang="en-GB" smtClean="0"/>
-              <a:t>20/06/2022</a:t>
+              <a:t>21/06/2022</a:t>
             </a:fld>
             <a:endParaRPr lang="en-GB"/>
           </a:p>
@@ -730,7 +740,7 @@
           <a:p>
             <a:fld id="{A7E93B79-5F87-463F-BE54-B700F7D9A626}" type="datetimeFigureOut">
               <a:rPr lang="en-GB" smtClean="0"/>
-              <a:t>20/06/2022</a:t>
+              <a:t>21/06/2022</a:t>
             </a:fld>
             <a:endParaRPr lang="en-GB"/>
           </a:p>
@@ -930,7 +940,7 @@
           <a:p>
             <a:fld id="{A7E93B79-5F87-463F-BE54-B700F7D9A626}" type="datetimeFigureOut">
               <a:rPr lang="en-GB" smtClean="0"/>
-              <a:t>20/06/2022</a:t>
+              <a:t>21/06/2022</a:t>
             </a:fld>
             <a:endParaRPr lang="en-GB"/>
           </a:p>
@@ -1140,7 +1150,7 @@
           <a:p>
             <a:fld id="{A7E93B79-5F87-463F-BE54-B700F7D9A626}" type="datetimeFigureOut">
               <a:rPr lang="en-GB" smtClean="0"/>
-              <a:t>20/06/2022</a:t>
+              <a:t>21/06/2022</a:t>
             </a:fld>
             <a:endParaRPr lang="en-GB"/>
           </a:p>
@@ -1340,7 +1350,7 @@
           <a:p>
             <a:fld id="{A7E93B79-5F87-463F-BE54-B700F7D9A626}" type="datetimeFigureOut">
               <a:rPr lang="en-GB" smtClean="0"/>
-              <a:t>20/06/2022</a:t>
+              <a:t>21/06/2022</a:t>
             </a:fld>
             <a:endParaRPr lang="en-GB"/>
           </a:p>
@@ -1616,7 +1626,7 @@
           <a:p>
             <a:fld id="{A7E93B79-5F87-463F-BE54-B700F7D9A626}" type="datetimeFigureOut">
               <a:rPr lang="en-GB" smtClean="0"/>
-              <a:t>20/06/2022</a:t>
+              <a:t>21/06/2022</a:t>
             </a:fld>
             <a:endParaRPr lang="en-GB"/>
           </a:p>
@@ -1884,7 +1894,7 @@
           <a:p>
             <a:fld id="{A7E93B79-5F87-463F-BE54-B700F7D9A626}" type="datetimeFigureOut">
               <a:rPr lang="en-GB" smtClean="0"/>
-              <a:t>20/06/2022</a:t>
+              <a:t>21/06/2022</a:t>
             </a:fld>
             <a:endParaRPr lang="en-GB"/>
           </a:p>
@@ -2299,7 +2309,7 @@
           <a:p>
             <a:fld id="{A7E93B79-5F87-463F-BE54-B700F7D9A626}" type="datetimeFigureOut">
               <a:rPr lang="en-GB" smtClean="0"/>
-              <a:t>20/06/2022</a:t>
+              <a:t>21/06/2022</a:t>
             </a:fld>
             <a:endParaRPr lang="en-GB"/>
           </a:p>
@@ -2441,7 +2451,7 @@
           <a:p>
             <a:fld id="{A7E93B79-5F87-463F-BE54-B700F7D9A626}" type="datetimeFigureOut">
               <a:rPr lang="en-GB" smtClean="0"/>
-              <a:t>20/06/2022</a:t>
+              <a:t>21/06/2022</a:t>
             </a:fld>
             <a:endParaRPr lang="en-GB"/>
           </a:p>
@@ -2554,7 +2564,7 @@
           <a:p>
             <a:fld id="{A7E93B79-5F87-463F-BE54-B700F7D9A626}" type="datetimeFigureOut">
               <a:rPr lang="en-GB" smtClean="0"/>
-              <a:t>20/06/2022</a:t>
+              <a:t>21/06/2022</a:t>
             </a:fld>
             <a:endParaRPr lang="en-GB"/>
           </a:p>
@@ -2867,7 +2877,7 @@
           <a:p>
             <a:fld id="{A7E93B79-5F87-463F-BE54-B700F7D9A626}" type="datetimeFigureOut">
               <a:rPr lang="en-GB" smtClean="0"/>
-              <a:t>20/06/2022</a:t>
+              <a:t>21/06/2022</a:t>
             </a:fld>
             <a:endParaRPr lang="en-GB"/>
           </a:p>
@@ -3156,7 +3166,7 @@
           <a:p>
             <a:fld id="{A7E93B79-5F87-463F-BE54-B700F7D9A626}" type="datetimeFigureOut">
               <a:rPr lang="en-GB" smtClean="0"/>
-              <a:t>20/06/2022</a:t>
+              <a:t>21/06/2022</a:t>
             </a:fld>
             <a:endParaRPr lang="en-GB"/>
           </a:p>
@@ -3399,7 +3409,7 @@
           <a:p>
             <a:fld id="{A7E93B79-5F87-463F-BE54-B700F7D9A626}" type="datetimeFigureOut">
               <a:rPr lang="en-GB" smtClean="0"/>
-              <a:t>20/06/2022</a:t>
+              <a:t>21/06/2022</a:t>
             </a:fld>
             <a:endParaRPr lang="en-GB"/>
           </a:p>
@@ -3856,7 +3866,7 @@
           <p:nvPr>
             <p:extLst>
               <p:ext uri="{D42A27DB-BD31-4B8C-83A1-F6EECF244321}">
-                <p14:modId xmlns:p14="http://schemas.microsoft.com/office/powerpoint/2010/main" val="351349011"/>
+                <p14:modId xmlns:p14="http://schemas.microsoft.com/office/powerpoint/2010/main" val="2457102182"/>
               </p:ext>
             </p:extLst>
           </p:nvPr>
@@ -4733,7 +4743,7 @@
                             <a:schemeClr val="tx1"/>
                           </a:solidFill>
                         </a:rPr>
-                        <a:t>Determining Learning Rate</a:t>
+                        <a:t>Configurations</a:t>
                       </a:r>
                     </a:p>
                   </a:txBody>
@@ -5570,7 +5580,7 @@
           <p:cNvPr id="2" name="Title 1">
             <a:extLst>
               <a:ext uri="{FF2B5EF4-FFF2-40B4-BE49-F238E27FC236}">
-                <a16:creationId xmlns:a16="http://schemas.microsoft.com/office/drawing/2014/main" id="{4CBB9562-1343-0F22-3EC4-6761C8D882E5}"/>
+                <a16:creationId xmlns:a16="http://schemas.microsoft.com/office/drawing/2014/main" id="{C626624E-CF09-9E89-3C00-3E36A4B08C8C}"/>
               </a:ext>
             </a:extLst>
           </p:cNvPr>
@@ -5586,7 +5596,10 @@
           <a:bodyPr/>
           <a:lstStyle/>
           <a:p>
-            <a:endParaRPr lang="en-GB"/>
+            <a:r>
+              <a:rPr lang="en-GB" dirty="0"/>
+              <a:t>Dataset Collection</a:t>
+            </a:r>
           </a:p>
         </p:txBody>
       </p:sp>
@@ -5595,7 +5608,7 @@
           <p:cNvPr id="3" name="Content Placeholder 2">
             <a:extLst>
               <a:ext uri="{FF2B5EF4-FFF2-40B4-BE49-F238E27FC236}">
-                <a16:creationId xmlns:a16="http://schemas.microsoft.com/office/drawing/2014/main" id="{D91E94A9-38DA-C5E3-26AB-0D3B0C80A99E}"/>
+                <a16:creationId xmlns:a16="http://schemas.microsoft.com/office/drawing/2014/main" id="{6671F954-794C-467F-F8ED-4BD649681A5A}"/>
               </a:ext>
             </a:extLst>
           </p:cNvPr>
@@ -5618,7 +5631,759 @@
     </p:spTree>
     <p:extLst>
       <p:ext uri="{BB962C8B-B14F-4D97-AF65-F5344CB8AC3E}">
-        <p14:creationId xmlns:p14="http://schemas.microsoft.com/office/powerpoint/2010/main" val="1810056726"/>
+        <p14:creationId xmlns:p14="http://schemas.microsoft.com/office/powerpoint/2010/main" val="3572003948"/>
+      </p:ext>
+    </p:extLst>
+  </p:cSld>
+  <p:clrMapOvr>
+    <a:masterClrMapping/>
+  </p:clrMapOvr>
+</p:sld>
+</file>
+
+<file path=ppt/slides/slide11.xml><?xml version="1.0" encoding="utf-8"?>
+<p:sld xmlns:a="http://schemas.openxmlformats.org/drawingml/2006/main" xmlns:r="http://schemas.openxmlformats.org/officeDocument/2006/relationships" xmlns:p="http://schemas.openxmlformats.org/presentationml/2006/main">
+  <p:cSld>
+    <p:spTree>
+      <p:nvGrpSpPr>
+        <p:cNvPr id="1" name=""/>
+        <p:cNvGrpSpPr/>
+        <p:nvPr/>
+      </p:nvGrpSpPr>
+      <p:grpSpPr>
+        <a:xfrm>
+          <a:off x="0" y="0"/>
+          <a:ext cx="0" cy="0"/>
+          <a:chOff x="0" y="0"/>
+          <a:chExt cx="0" cy="0"/>
+        </a:xfrm>
+      </p:grpSpPr>
+      <p:sp>
+        <p:nvSpPr>
+          <p:cNvPr id="2" name="Title 1">
+            <a:extLst>
+              <a:ext uri="{FF2B5EF4-FFF2-40B4-BE49-F238E27FC236}">
+                <a16:creationId xmlns:a16="http://schemas.microsoft.com/office/drawing/2014/main" id="{50A2FAE8-8D4E-AF0D-52D3-23EFB3ECE9EF}"/>
+              </a:ext>
+            </a:extLst>
+          </p:cNvPr>
+          <p:cNvSpPr>
+            <a:spLocks noGrp="1"/>
+          </p:cNvSpPr>
+          <p:nvPr>
+            <p:ph type="title"/>
+          </p:nvPr>
+        </p:nvSpPr>
+        <p:spPr/>
+        <p:txBody>
+          <a:bodyPr/>
+          <a:lstStyle/>
+          <a:p>
+            <a:r>
+              <a:rPr lang="en-GB" dirty="0"/>
+              <a:t>Text Analysis</a:t>
+            </a:r>
+          </a:p>
+        </p:txBody>
+      </p:sp>
+      <p:sp>
+        <p:nvSpPr>
+          <p:cNvPr id="3" name="Content Placeholder 2">
+            <a:extLst>
+              <a:ext uri="{FF2B5EF4-FFF2-40B4-BE49-F238E27FC236}">
+                <a16:creationId xmlns:a16="http://schemas.microsoft.com/office/drawing/2014/main" id="{C5DECBE0-25BE-271C-8B8C-6207F029100C}"/>
+              </a:ext>
+            </a:extLst>
+          </p:cNvPr>
+          <p:cNvSpPr>
+            <a:spLocks noGrp="1"/>
+          </p:cNvSpPr>
+          <p:nvPr>
+            <p:ph idx="1"/>
+          </p:nvPr>
+        </p:nvSpPr>
+        <p:spPr/>
+        <p:txBody>
+          <a:bodyPr/>
+          <a:lstStyle/>
+          <a:p>
+            <a:endParaRPr lang="en-GB"/>
+          </a:p>
+        </p:txBody>
+      </p:sp>
+    </p:spTree>
+    <p:extLst>
+      <p:ext uri="{BB962C8B-B14F-4D97-AF65-F5344CB8AC3E}">
+        <p14:creationId xmlns:p14="http://schemas.microsoft.com/office/powerpoint/2010/main" val="1910927806"/>
+      </p:ext>
+    </p:extLst>
+  </p:cSld>
+  <p:clrMapOvr>
+    <a:masterClrMapping/>
+  </p:clrMapOvr>
+</p:sld>
+</file>
+
+<file path=ppt/slides/slide12.xml><?xml version="1.0" encoding="utf-8"?>
+<p:sld xmlns:a="http://schemas.openxmlformats.org/drawingml/2006/main" xmlns:r="http://schemas.openxmlformats.org/officeDocument/2006/relationships" xmlns:p="http://schemas.openxmlformats.org/presentationml/2006/main">
+  <p:cSld>
+    <p:spTree>
+      <p:nvGrpSpPr>
+        <p:cNvPr id="1" name=""/>
+        <p:cNvGrpSpPr/>
+        <p:nvPr/>
+      </p:nvGrpSpPr>
+      <p:grpSpPr>
+        <a:xfrm>
+          <a:off x="0" y="0"/>
+          <a:ext cx="0" cy="0"/>
+          <a:chOff x="0" y="0"/>
+          <a:chExt cx="0" cy="0"/>
+        </a:xfrm>
+      </p:grpSpPr>
+      <p:sp>
+        <p:nvSpPr>
+          <p:cNvPr id="2" name="Title 1">
+            <a:extLst>
+              <a:ext uri="{FF2B5EF4-FFF2-40B4-BE49-F238E27FC236}">
+                <a16:creationId xmlns:a16="http://schemas.microsoft.com/office/drawing/2014/main" id="{2A59A153-E922-1B54-8C09-224A5783DD0D}"/>
+              </a:ext>
+            </a:extLst>
+          </p:cNvPr>
+          <p:cNvSpPr>
+            <a:spLocks noGrp="1"/>
+          </p:cNvSpPr>
+          <p:nvPr>
+            <p:ph type="title"/>
+          </p:nvPr>
+        </p:nvSpPr>
+        <p:spPr/>
+        <p:txBody>
+          <a:bodyPr/>
+          <a:lstStyle/>
+          <a:p>
+            <a:r>
+              <a:rPr lang="en-GB" dirty="0"/>
+              <a:t>Text </a:t>
+            </a:r>
+            <a:r>
+              <a:rPr lang="en-GB" dirty="0" err="1"/>
+              <a:t>Preprocessing</a:t>
+            </a:r>
+            <a:endParaRPr lang="en-GB" dirty="0"/>
+          </a:p>
+        </p:txBody>
+      </p:sp>
+      <p:sp>
+        <p:nvSpPr>
+          <p:cNvPr id="3" name="Content Placeholder 2">
+            <a:extLst>
+              <a:ext uri="{FF2B5EF4-FFF2-40B4-BE49-F238E27FC236}">
+                <a16:creationId xmlns:a16="http://schemas.microsoft.com/office/drawing/2014/main" id="{DAF040E7-03FB-E3A1-C92F-6A2740EA4B7F}"/>
+              </a:ext>
+            </a:extLst>
+          </p:cNvPr>
+          <p:cNvSpPr>
+            <a:spLocks noGrp="1"/>
+          </p:cNvSpPr>
+          <p:nvPr>
+            <p:ph idx="1"/>
+          </p:nvPr>
+        </p:nvSpPr>
+        <p:spPr/>
+        <p:txBody>
+          <a:bodyPr/>
+          <a:lstStyle/>
+          <a:p>
+            <a:endParaRPr lang="en-GB"/>
+          </a:p>
+        </p:txBody>
+      </p:sp>
+    </p:spTree>
+    <p:extLst>
+      <p:ext uri="{BB962C8B-B14F-4D97-AF65-F5344CB8AC3E}">
+        <p14:creationId xmlns:p14="http://schemas.microsoft.com/office/powerpoint/2010/main" val="1232899613"/>
+      </p:ext>
+    </p:extLst>
+  </p:cSld>
+  <p:clrMapOvr>
+    <a:masterClrMapping/>
+  </p:clrMapOvr>
+</p:sld>
+</file>
+
+<file path=ppt/slides/slide13.xml><?xml version="1.0" encoding="utf-8"?>
+<p:sld xmlns:a="http://schemas.openxmlformats.org/drawingml/2006/main" xmlns:r="http://schemas.openxmlformats.org/officeDocument/2006/relationships" xmlns:p="http://schemas.openxmlformats.org/presentationml/2006/main">
+  <p:cSld>
+    <p:spTree>
+      <p:nvGrpSpPr>
+        <p:cNvPr id="1" name=""/>
+        <p:cNvGrpSpPr/>
+        <p:nvPr/>
+      </p:nvGrpSpPr>
+      <p:grpSpPr>
+        <a:xfrm>
+          <a:off x="0" y="0"/>
+          <a:ext cx="0" cy="0"/>
+          <a:chOff x="0" y="0"/>
+          <a:chExt cx="0" cy="0"/>
+        </a:xfrm>
+      </p:grpSpPr>
+      <p:sp>
+        <p:nvSpPr>
+          <p:cNvPr id="2" name="Title 1">
+            <a:extLst>
+              <a:ext uri="{FF2B5EF4-FFF2-40B4-BE49-F238E27FC236}">
+                <a16:creationId xmlns:a16="http://schemas.microsoft.com/office/drawing/2014/main" id="{27F147C8-960E-8804-1A24-5F887BAFAF5D}"/>
+              </a:ext>
+            </a:extLst>
+          </p:cNvPr>
+          <p:cNvSpPr>
+            <a:spLocks noGrp="1"/>
+          </p:cNvSpPr>
+          <p:nvPr>
+            <p:ph type="title"/>
+          </p:nvPr>
+        </p:nvSpPr>
+        <p:spPr/>
+        <p:txBody>
+          <a:bodyPr/>
+          <a:lstStyle/>
+          <a:p>
+            <a:r>
+              <a:rPr lang="en-GB" dirty="0"/>
+              <a:t>Configurations</a:t>
+            </a:r>
+          </a:p>
+        </p:txBody>
+      </p:sp>
+      <p:sp>
+        <p:nvSpPr>
+          <p:cNvPr id="3" name="Content Placeholder 2">
+            <a:extLst>
+              <a:ext uri="{FF2B5EF4-FFF2-40B4-BE49-F238E27FC236}">
+                <a16:creationId xmlns:a16="http://schemas.microsoft.com/office/drawing/2014/main" id="{25A429D6-1773-847B-924F-6E4C74B8E5A2}"/>
+              </a:ext>
+            </a:extLst>
+          </p:cNvPr>
+          <p:cNvSpPr>
+            <a:spLocks noGrp="1"/>
+          </p:cNvSpPr>
+          <p:nvPr>
+            <p:ph idx="1"/>
+          </p:nvPr>
+        </p:nvSpPr>
+        <p:spPr/>
+        <p:txBody>
+          <a:bodyPr/>
+          <a:lstStyle/>
+          <a:p>
+            <a:endParaRPr lang="en-GB" dirty="0"/>
+          </a:p>
+        </p:txBody>
+      </p:sp>
+    </p:spTree>
+    <p:extLst>
+      <p:ext uri="{BB962C8B-B14F-4D97-AF65-F5344CB8AC3E}">
+        <p14:creationId xmlns:p14="http://schemas.microsoft.com/office/powerpoint/2010/main" val="3585554156"/>
+      </p:ext>
+    </p:extLst>
+  </p:cSld>
+  <p:clrMapOvr>
+    <a:masterClrMapping/>
+  </p:clrMapOvr>
+</p:sld>
+</file>
+
+<file path=ppt/slides/slide14.xml><?xml version="1.0" encoding="utf-8"?>
+<p:sld xmlns:a="http://schemas.openxmlformats.org/drawingml/2006/main" xmlns:r="http://schemas.openxmlformats.org/officeDocument/2006/relationships" xmlns:p="http://schemas.openxmlformats.org/presentationml/2006/main">
+  <p:cSld>
+    <p:spTree>
+      <p:nvGrpSpPr>
+        <p:cNvPr id="1" name=""/>
+        <p:cNvGrpSpPr/>
+        <p:nvPr/>
+      </p:nvGrpSpPr>
+      <p:grpSpPr>
+        <a:xfrm>
+          <a:off x="0" y="0"/>
+          <a:ext cx="0" cy="0"/>
+          <a:chOff x="0" y="0"/>
+          <a:chExt cx="0" cy="0"/>
+        </a:xfrm>
+      </p:grpSpPr>
+      <p:sp>
+        <p:nvSpPr>
+          <p:cNvPr id="2" name="Title 1">
+            <a:extLst>
+              <a:ext uri="{FF2B5EF4-FFF2-40B4-BE49-F238E27FC236}">
+                <a16:creationId xmlns:a16="http://schemas.microsoft.com/office/drawing/2014/main" id="{BBFE182C-5A43-534A-D351-888FC564413A}"/>
+              </a:ext>
+            </a:extLst>
+          </p:cNvPr>
+          <p:cNvSpPr>
+            <a:spLocks noGrp="1"/>
+          </p:cNvSpPr>
+          <p:nvPr>
+            <p:ph type="title"/>
+          </p:nvPr>
+        </p:nvSpPr>
+        <p:spPr/>
+        <p:txBody>
+          <a:bodyPr/>
+          <a:lstStyle/>
+          <a:p>
+            <a:r>
+              <a:rPr lang="en-GB" dirty="0"/>
+              <a:t>Hate Network Algorithm</a:t>
+            </a:r>
+          </a:p>
+        </p:txBody>
+      </p:sp>
+      <p:sp>
+        <p:nvSpPr>
+          <p:cNvPr id="3" name="Content Placeholder 2">
+            <a:extLst>
+              <a:ext uri="{FF2B5EF4-FFF2-40B4-BE49-F238E27FC236}">
+                <a16:creationId xmlns:a16="http://schemas.microsoft.com/office/drawing/2014/main" id="{80076869-AA9A-6B28-EF4D-223ADF0DDFB1}"/>
+              </a:ext>
+            </a:extLst>
+          </p:cNvPr>
+          <p:cNvSpPr>
+            <a:spLocks noGrp="1"/>
+          </p:cNvSpPr>
+          <p:nvPr>
+            <p:ph idx="1"/>
+          </p:nvPr>
+        </p:nvSpPr>
+        <p:spPr/>
+        <p:txBody>
+          <a:bodyPr/>
+          <a:lstStyle/>
+          <a:p>
+            <a:endParaRPr lang="en-GB"/>
+          </a:p>
+        </p:txBody>
+      </p:sp>
+    </p:spTree>
+    <p:extLst>
+      <p:ext uri="{BB962C8B-B14F-4D97-AF65-F5344CB8AC3E}">
+        <p14:creationId xmlns:p14="http://schemas.microsoft.com/office/powerpoint/2010/main" val="2709816030"/>
+      </p:ext>
+    </p:extLst>
+  </p:cSld>
+  <p:clrMapOvr>
+    <a:masterClrMapping/>
+  </p:clrMapOvr>
+</p:sld>
+</file>
+
+<file path=ppt/slides/slide15.xml><?xml version="1.0" encoding="utf-8"?>
+<p:sld xmlns:a="http://schemas.openxmlformats.org/drawingml/2006/main" xmlns:r="http://schemas.openxmlformats.org/officeDocument/2006/relationships" xmlns:p="http://schemas.openxmlformats.org/presentationml/2006/main">
+  <p:cSld>
+    <p:spTree>
+      <p:nvGrpSpPr>
+        <p:cNvPr id="1" name=""/>
+        <p:cNvGrpSpPr/>
+        <p:nvPr/>
+      </p:nvGrpSpPr>
+      <p:grpSpPr>
+        <a:xfrm>
+          <a:off x="0" y="0"/>
+          <a:ext cx="0" cy="0"/>
+          <a:chOff x="0" y="0"/>
+          <a:chExt cx="0" cy="0"/>
+        </a:xfrm>
+      </p:grpSpPr>
+      <p:sp>
+        <p:nvSpPr>
+          <p:cNvPr id="2" name="Title 1">
+            <a:extLst>
+              <a:ext uri="{FF2B5EF4-FFF2-40B4-BE49-F238E27FC236}">
+                <a16:creationId xmlns:a16="http://schemas.microsoft.com/office/drawing/2014/main" id="{6BBF8C34-C7AD-57C5-19FF-10BC79920466}"/>
+              </a:ext>
+            </a:extLst>
+          </p:cNvPr>
+          <p:cNvSpPr>
+            <a:spLocks noGrp="1"/>
+          </p:cNvSpPr>
+          <p:nvPr>
+            <p:ph type="title"/>
+          </p:nvPr>
+        </p:nvSpPr>
+        <p:spPr/>
+        <p:txBody>
+          <a:bodyPr/>
+          <a:lstStyle/>
+          <a:p>
+            <a:r>
+              <a:rPr lang="en-GB" dirty="0"/>
+              <a:t>Threshold Determination</a:t>
+            </a:r>
+          </a:p>
+        </p:txBody>
+      </p:sp>
+      <p:sp>
+        <p:nvSpPr>
+          <p:cNvPr id="3" name="Content Placeholder 2">
+            <a:extLst>
+              <a:ext uri="{FF2B5EF4-FFF2-40B4-BE49-F238E27FC236}">
+                <a16:creationId xmlns:a16="http://schemas.microsoft.com/office/drawing/2014/main" id="{797D2CA5-2FA0-4AA1-0AAD-40F1B262FF1D}"/>
+              </a:ext>
+            </a:extLst>
+          </p:cNvPr>
+          <p:cNvSpPr>
+            <a:spLocks noGrp="1"/>
+          </p:cNvSpPr>
+          <p:nvPr>
+            <p:ph idx="1"/>
+          </p:nvPr>
+        </p:nvSpPr>
+        <p:spPr/>
+        <p:txBody>
+          <a:bodyPr/>
+          <a:lstStyle/>
+          <a:p>
+            <a:endParaRPr lang="en-GB"/>
+          </a:p>
+        </p:txBody>
+      </p:sp>
+    </p:spTree>
+    <p:extLst>
+      <p:ext uri="{BB962C8B-B14F-4D97-AF65-F5344CB8AC3E}">
+        <p14:creationId xmlns:p14="http://schemas.microsoft.com/office/powerpoint/2010/main" val="4129018246"/>
+      </p:ext>
+    </p:extLst>
+  </p:cSld>
+  <p:clrMapOvr>
+    <a:masterClrMapping/>
+  </p:clrMapOvr>
+</p:sld>
+</file>
+
+<file path=ppt/slides/slide16.xml><?xml version="1.0" encoding="utf-8"?>
+<p:sld xmlns:a="http://schemas.openxmlformats.org/drawingml/2006/main" xmlns:r="http://schemas.openxmlformats.org/officeDocument/2006/relationships" xmlns:p="http://schemas.openxmlformats.org/presentationml/2006/main">
+  <p:cSld>
+    <p:spTree>
+      <p:nvGrpSpPr>
+        <p:cNvPr id="1" name=""/>
+        <p:cNvGrpSpPr/>
+        <p:nvPr/>
+      </p:nvGrpSpPr>
+      <p:grpSpPr>
+        <a:xfrm>
+          <a:off x="0" y="0"/>
+          <a:ext cx="0" cy="0"/>
+          <a:chOff x="0" y="0"/>
+          <a:chExt cx="0" cy="0"/>
+        </a:xfrm>
+      </p:grpSpPr>
+      <p:sp>
+        <p:nvSpPr>
+          <p:cNvPr id="2" name="Title 1">
+            <a:extLst>
+              <a:ext uri="{FF2B5EF4-FFF2-40B4-BE49-F238E27FC236}">
+                <a16:creationId xmlns:a16="http://schemas.microsoft.com/office/drawing/2014/main" id="{0F1CAE51-91BD-A3C1-4F41-B402B1CEFDE6}"/>
+              </a:ext>
+            </a:extLst>
+          </p:cNvPr>
+          <p:cNvSpPr>
+            <a:spLocks noGrp="1"/>
+          </p:cNvSpPr>
+          <p:nvPr>
+            <p:ph type="title"/>
+          </p:nvPr>
+        </p:nvSpPr>
+        <p:spPr/>
+        <p:txBody>
+          <a:bodyPr/>
+          <a:lstStyle/>
+          <a:p>
+            <a:r>
+              <a:rPr lang="en-GB" dirty="0"/>
+              <a:t>Testing</a:t>
+            </a:r>
+          </a:p>
+        </p:txBody>
+      </p:sp>
+      <p:sp>
+        <p:nvSpPr>
+          <p:cNvPr id="3" name="Content Placeholder 2">
+            <a:extLst>
+              <a:ext uri="{FF2B5EF4-FFF2-40B4-BE49-F238E27FC236}">
+                <a16:creationId xmlns:a16="http://schemas.microsoft.com/office/drawing/2014/main" id="{54DA8F62-A271-BD95-FB02-BD9D23E95E48}"/>
+              </a:ext>
+            </a:extLst>
+          </p:cNvPr>
+          <p:cNvSpPr>
+            <a:spLocks noGrp="1"/>
+          </p:cNvSpPr>
+          <p:nvPr>
+            <p:ph idx="1"/>
+          </p:nvPr>
+        </p:nvSpPr>
+        <p:spPr/>
+        <p:txBody>
+          <a:bodyPr/>
+          <a:lstStyle/>
+          <a:p>
+            <a:endParaRPr lang="en-GB" dirty="0"/>
+          </a:p>
+        </p:txBody>
+      </p:sp>
+    </p:spTree>
+    <p:extLst>
+      <p:ext uri="{BB962C8B-B14F-4D97-AF65-F5344CB8AC3E}">
+        <p14:creationId xmlns:p14="http://schemas.microsoft.com/office/powerpoint/2010/main" val="2429197893"/>
+      </p:ext>
+    </p:extLst>
+  </p:cSld>
+  <p:clrMapOvr>
+    <a:masterClrMapping/>
+  </p:clrMapOvr>
+</p:sld>
+</file>
+
+<file path=ppt/slides/slide17.xml><?xml version="1.0" encoding="utf-8"?>
+<p:sld xmlns:a="http://schemas.openxmlformats.org/drawingml/2006/main" xmlns:r="http://schemas.openxmlformats.org/officeDocument/2006/relationships" xmlns:p="http://schemas.openxmlformats.org/presentationml/2006/main">
+  <p:cSld>
+    <p:spTree>
+      <p:nvGrpSpPr>
+        <p:cNvPr id="1" name=""/>
+        <p:cNvGrpSpPr/>
+        <p:nvPr/>
+      </p:nvGrpSpPr>
+      <p:grpSpPr>
+        <a:xfrm>
+          <a:off x="0" y="0"/>
+          <a:ext cx="0" cy="0"/>
+          <a:chOff x="0" y="0"/>
+          <a:chExt cx="0" cy="0"/>
+        </a:xfrm>
+      </p:grpSpPr>
+      <p:sp>
+        <p:nvSpPr>
+          <p:cNvPr id="2" name="Title 1">
+            <a:extLst>
+              <a:ext uri="{FF2B5EF4-FFF2-40B4-BE49-F238E27FC236}">
+                <a16:creationId xmlns:a16="http://schemas.microsoft.com/office/drawing/2014/main" id="{DD2A4DF7-D254-ECEB-52C9-F7CDB6A0D037}"/>
+              </a:ext>
+            </a:extLst>
+          </p:cNvPr>
+          <p:cNvSpPr>
+            <a:spLocks noGrp="1"/>
+          </p:cNvSpPr>
+          <p:nvPr>
+            <p:ph type="title"/>
+          </p:nvPr>
+        </p:nvSpPr>
+        <p:spPr/>
+        <p:txBody>
+          <a:bodyPr/>
+          <a:lstStyle/>
+          <a:p>
+            <a:r>
+              <a:rPr lang="en-GB" dirty="0"/>
+              <a:t>Failed Attempts</a:t>
+            </a:r>
+          </a:p>
+        </p:txBody>
+      </p:sp>
+      <p:sp>
+        <p:nvSpPr>
+          <p:cNvPr id="3" name="Content Placeholder 2">
+            <a:extLst>
+              <a:ext uri="{FF2B5EF4-FFF2-40B4-BE49-F238E27FC236}">
+                <a16:creationId xmlns:a16="http://schemas.microsoft.com/office/drawing/2014/main" id="{B20BC383-DD2A-5527-CA62-E5F8BD822D68}"/>
+              </a:ext>
+            </a:extLst>
+          </p:cNvPr>
+          <p:cNvSpPr>
+            <a:spLocks noGrp="1"/>
+          </p:cNvSpPr>
+          <p:nvPr>
+            <p:ph idx="1"/>
+          </p:nvPr>
+        </p:nvSpPr>
+        <p:spPr/>
+        <p:txBody>
+          <a:bodyPr/>
+          <a:lstStyle/>
+          <a:p>
+            <a:endParaRPr lang="en-GB"/>
+          </a:p>
+        </p:txBody>
+      </p:sp>
+    </p:spTree>
+    <p:extLst>
+      <p:ext uri="{BB962C8B-B14F-4D97-AF65-F5344CB8AC3E}">
+        <p14:creationId xmlns:p14="http://schemas.microsoft.com/office/powerpoint/2010/main" val="4082636849"/>
+      </p:ext>
+    </p:extLst>
+  </p:cSld>
+  <p:clrMapOvr>
+    <a:masterClrMapping/>
+  </p:clrMapOvr>
+</p:sld>
+</file>
+
+<file path=ppt/slides/slide18.xml><?xml version="1.0" encoding="utf-8"?>
+<p:sld xmlns:a="http://schemas.openxmlformats.org/drawingml/2006/main" xmlns:r="http://schemas.openxmlformats.org/officeDocument/2006/relationships" xmlns:p="http://schemas.openxmlformats.org/presentationml/2006/main">
+  <p:cSld>
+    <p:spTree>
+      <p:nvGrpSpPr>
+        <p:cNvPr id="1" name=""/>
+        <p:cNvGrpSpPr/>
+        <p:nvPr/>
+      </p:nvGrpSpPr>
+      <p:grpSpPr>
+        <a:xfrm>
+          <a:off x="0" y="0"/>
+          <a:ext cx="0" cy="0"/>
+          <a:chOff x="0" y="0"/>
+          <a:chExt cx="0" cy="0"/>
+        </a:xfrm>
+      </p:grpSpPr>
+      <p:sp>
+        <p:nvSpPr>
+          <p:cNvPr id="2" name="Title 1">
+            <a:extLst>
+              <a:ext uri="{FF2B5EF4-FFF2-40B4-BE49-F238E27FC236}">
+                <a16:creationId xmlns:a16="http://schemas.microsoft.com/office/drawing/2014/main" id="{E6433C2C-41C4-3AE0-B5D1-26329C79A860}"/>
+              </a:ext>
+            </a:extLst>
+          </p:cNvPr>
+          <p:cNvSpPr>
+            <a:spLocks noGrp="1"/>
+          </p:cNvSpPr>
+          <p:nvPr>
+            <p:ph type="title"/>
+          </p:nvPr>
+        </p:nvSpPr>
+        <p:spPr/>
+        <p:txBody>
+          <a:bodyPr/>
+          <a:lstStyle/>
+          <a:p>
+            <a:r>
+              <a:rPr lang="en-GB" dirty="0"/>
+              <a:t>Conclusion and Future Works</a:t>
+            </a:r>
+          </a:p>
+        </p:txBody>
+      </p:sp>
+      <p:sp>
+        <p:nvSpPr>
+          <p:cNvPr id="3" name="Content Placeholder 2">
+            <a:extLst>
+              <a:ext uri="{FF2B5EF4-FFF2-40B4-BE49-F238E27FC236}">
+                <a16:creationId xmlns:a16="http://schemas.microsoft.com/office/drawing/2014/main" id="{78316FD2-39DD-987E-4AB6-D52A700185E3}"/>
+              </a:ext>
+            </a:extLst>
+          </p:cNvPr>
+          <p:cNvSpPr>
+            <a:spLocks noGrp="1"/>
+          </p:cNvSpPr>
+          <p:nvPr>
+            <p:ph idx="1"/>
+          </p:nvPr>
+        </p:nvSpPr>
+        <p:spPr/>
+        <p:txBody>
+          <a:bodyPr/>
+          <a:lstStyle/>
+          <a:p>
+            <a:endParaRPr lang="en-GB"/>
+          </a:p>
+        </p:txBody>
+      </p:sp>
+    </p:spTree>
+    <p:extLst>
+      <p:ext uri="{BB962C8B-B14F-4D97-AF65-F5344CB8AC3E}">
+        <p14:creationId xmlns:p14="http://schemas.microsoft.com/office/powerpoint/2010/main" val="3983017103"/>
+      </p:ext>
+    </p:extLst>
+  </p:cSld>
+  <p:clrMapOvr>
+    <a:masterClrMapping/>
+  </p:clrMapOvr>
+</p:sld>
+</file>
+
+<file path=ppt/slides/slide19.xml><?xml version="1.0" encoding="utf-8"?>
+<p:sld xmlns:a="http://schemas.openxmlformats.org/drawingml/2006/main" xmlns:r="http://schemas.openxmlformats.org/officeDocument/2006/relationships" xmlns:p="http://schemas.openxmlformats.org/presentationml/2006/main">
+  <p:cSld>
+    <p:spTree>
+      <p:nvGrpSpPr>
+        <p:cNvPr id="1" name=""/>
+        <p:cNvGrpSpPr/>
+        <p:nvPr/>
+      </p:nvGrpSpPr>
+      <p:grpSpPr>
+        <a:xfrm>
+          <a:off x="0" y="0"/>
+          <a:ext cx="0" cy="0"/>
+          <a:chOff x="0" y="0"/>
+          <a:chExt cx="0" cy="0"/>
+        </a:xfrm>
+      </p:grpSpPr>
+      <p:sp>
+        <p:nvSpPr>
+          <p:cNvPr id="2" name="Title 1">
+            <a:extLst>
+              <a:ext uri="{FF2B5EF4-FFF2-40B4-BE49-F238E27FC236}">
+                <a16:creationId xmlns:a16="http://schemas.microsoft.com/office/drawing/2014/main" id="{BAE03B4A-A1EC-1A79-F407-D14DA261B93E}"/>
+              </a:ext>
+            </a:extLst>
+          </p:cNvPr>
+          <p:cNvSpPr>
+            <a:spLocks noGrp="1"/>
+          </p:cNvSpPr>
+          <p:nvPr>
+            <p:ph type="title"/>
+          </p:nvPr>
+        </p:nvSpPr>
+        <p:spPr/>
+        <p:txBody>
+          <a:bodyPr/>
+          <a:lstStyle/>
+          <a:p>
+            <a:r>
+              <a:rPr lang="en-GB" dirty="0"/>
+              <a:t>Hate Network Detection</a:t>
+            </a:r>
+          </a:p>
+        </p:txBody>
+      </p:sp>
+      <p:sp>
+        <p:nvSpPr>
+          <p:cNvPr id="3" name="Content Placeholder 2">
+            <a:extLst>
+              <a:ext uri="{FF2B5EF4-FFF2-40B4-BE49-F238E27FC236}">
+                <a16:creationId xmlns:a16="http://schemas.microsoft.com/office/drawing/2014/main" id="{C7E23685-11C1-0899-F2D6-F7B3864E918E}"/>
+              </a:ext>
+            </a:extLst>
+          </p:cNvPr>
+          <p:cNvSpPr>
+            <a:spLocks noGrp="1"/>
+          </p:cNvSpPr>
+          <p:nvPr>
+            <p:ph idx="1"/>
+          </p:nvPr>
+        </p:nvSpPr>
+        <p:spPr/>
+        <p:txBody>
+          <a:bodyPr/>
+          <a:lstStyle/>
+          <a:p>
+            <a:endParaRPr lang="en-GB" dirty="0"/>
+          </a:p>
+        </p:txBody>
+      </p:sp>
+    </p:spTree>
+    <p:extLst>
+      <p:ext uri="{BB962C8B-B14F-4D97-AF65-F5344CB8AC3E}">
+        <p14:creationId xmlns:p14="http://schemas.microsoft.com/office/powerpoint/2010/main" val="3454766599"/>
       </p:ext>
     </p:extLst>
   </p:cSld>
@@ -5705,6 +6470,89 @@
     <p:extLst>
       <p:ext uri="{BB962C8B-B14F-4D97-AF65-F5344CB8AC3E}">
         <p14:creationId xmlns:p14="http://schemas.microsoft.com/office/powerpoint/2010/main" val="1234070076"/>
+      </p:ext>
+    </p:extLst>
+  </p:cSld>
+  <p:clrMapOvr>
+    <a:masterClrMapping/>
+  </p:clrMapOvr>
+</p:sld>
+</file>
+
+<file path=ppt/slides/slide20.xml><?xml version="1.0" encoding="utf-8"?>
+<p:sld xmlns:a="http://schemas.openxmlformats.org/drawingml/2006/main" xmlns:r="http://schemas.openxmlformats.org/officeDocument/2006/relationships" xmlns:p="http://schemas.openxmlformats.org/presentationml/2006/main">
+  <p:cSld>
+    <p:spTree>
+      <p:nvGrpSpPr>
+        <p:cNvPr id="1" name=""/>
+        <p:cNvGrpSpPr/>
+        <p:nvPr/>
+      </p:nvGrpSpPr>
+      <p:grpSpPr>
+        <a:xfrm>
+          <a:off x="0" y="0"/>
+          <a:ext cx="0" cy="0"/>
+          <a:chOff x="0" y="0"/>
+          <a:chExt cx="0" cy="0"/>
+        </a:xfrm>
+      </p:grpSpPr>
+      <p:sp>
+        <p:nvSpPr>
+          <p:cNvPr id="2" name="Title 1">
+            <a:extLst>
+              <a:ext uri="{FF2B5EF4-FFF2-40B4-BE49-F238E27FC236}">
+                <a16:creationId xmlns:a16="http://schemas.microsoft.com/office/drawing/2014/main" id="{B59DF5AC-A914-9BC6-B2DB-E233A0863519}"/>
+              </a:ext>
+            </a:extLst>
+          </p:cNvPr>
+          <p:cNvSpPr>
+            <a:spLocks noGrp="1"/>
+          </p:cNvSpPr>
+          <p:nvPr>
+            <p:ph type="title"/>
+          </p:nvPr>
+        </p:nvSpPr>
+        <p:spPr/>
+        <p:txBody>
+          <a:bodyPr/>
+          <a:lstStyle/>
+          <a:p>
+            <a:r>
+              <a:rPr lang="en-GB" dirty="0"/>
+              <a:t>Questions?</a:t>
+            </a:r>
+          </a:p>
+        </p:txBody>
+      </p:sp>
+      <p:sp>
+        <p:nvSpPr>
+          <p:cNvPr id="3" name="Content Placeholder 2">
+            <a:extLst>
+              <a:ext uri="{FF2B5EF4-FFF2-40B4-BE49-F238E27FC236}">
+                <a16:creationId xmlns:a16="http://schemas.microsoft.com/office/drawing/2014/main" id="{75D5C71D-ACE2-EB47-7F61-D3A227178340}"/>
+              </a:ext>
+            </a:extLst>
+          </p:cNvPr>
+          <p:cNvSpPr>
+            <a:spLocks noGrp="1"/>
+          </p:cNvSpPr>
+          <p:nvPr>
+            <p:ph idx="1"/>
+          </p:nvPr>
+        </p:nvSpPr>
+        <p:spPr/>
+        <p:txBody>
+          <a:bodyPr/>
+          <a:lstStyle/>
+          <a:p>
+            <a:endParaRPr lang="en-GB"/>
+          </a:p>
+        </p:txBody>
+      </p:sp>
+    </p:spTree>
+    <p:extLst>
+      <p:ext uri="{BB962C8B-B14F-4D97-AF65-F5344CB8AC3E}">
+        <p14:creationId xmlns:p14="http://schemas.microsoft.com/office/powerpoint/2010/main" val="534439601"/>
       </p:ext>
     </p:extLst>
   </p:cSld>
@@ -5956,6 +6804,27 @@
           <a:bodyPr/>
           <a:lstStyle/>
           <a:p>
+            <a:r>
+              <a:rPr lang="en-GB" dirty="0"/>
+              <a:t>Hate Speech is large and varied</a:t>
+            </a:r>
+          </a:p>
+          <a:p>
+            <a:r>
+              <a:rPr lang="en-GB" dirty="0"/>
+              <a:t>Cannot be done manually – We cannot monitor every social media post + we as humans have bias</a:t>
+            </a:r>
+          </a:p>
+          <a:p>
+            <a:r>
+              <a:rPr lang="en-GB" dirty="0"/>
+              <a:t>Only detects one person at a time</a:t>
+            </a:r>
+          </a:p>
+          <a:p>
+            <a:pPr marL="0" indent="0">
+              <a:buNone/>
+            </a:pPr>
             <a:endParaRPr lang="en-GB" dirty="0"/>
           </a:p>
         </p:txBody>
@@ -6047,13 +6916,13 @@
           <a:p>
             <a:r>
               <a:rPr lang="en-GB" dirty="0"/>
+              <a:t>NBSVMs</a:t>
+            </a:r>
+          </a:p>
+          <a:p>
+            <a:r>
+              <a:rPr lang="en-GB" dirty="0"/>
               <a:t>GRUs</a:t>
-            </a:r>
-          </a:p>
-          <a:p>
-            <a:r>
-              <a:rPr lang="en-GB" dirty="0"/>
-              <a:t>NBSVMs</a:t>
             </a:r>
           </a:p>
           <a:p>
@@ -6099,7 +6968,7 @@
           <p:cNvPr id="2" name="Title 1">
             <a:extLst>
               <a:ext uri="{FF2B5EF4-FFF2-40B4-BE49-F238E27FC236}">
-                <a16:creationId xmlns:a16="http://schemas.microsoft.com/office/drawing/2014/main" id="{BAE03B4A-A1EC-1A79-F407-D14DA261B93E}"/>
+                <a16:creationId xmlns:a16="http://schemas.microsoft.com/office/drawing/2014/main" id="{EDE24B59-46B9-ACEA-0EAF-594B201733DC}"/>
               </a:ext>
             </a:extLst>
           </p:cNvPr>
@@ -6117,7 +6986,7 @@
           <a:p>
             <a:r>
               <a:rPr lang="en-GB" dirty="0"/>
-              <a:t>Hate Network Detection</a:t>
+              <a:t>K-NNs</a:t>
             </a:r>
           </a:p>
         </p:txBody>
@@ -6127,7 +6996,7 @@
           <p:cNvPr id="3" name="Content Placeholder 2">
             <a:extLst>
               <a:ext uri="{FF2B5EF4-FFF2-40B4-BE49-F238E27FC236}">
-                <a16:creationId xmlns:a16="http://schemas.microsoft.com/office/drawing/2014/main" id="{C7E23685-11C1-0899-F2D6-F7B3864E918E}"/>
+                <a16:creationId xmlns:a16="http://schemas.microsoft.com/office/drawing/2014/main" id="{00E59BB4-7B29-4EDB-2651-61A03D22A685}"/>
               </a:ext>
             </a:extLst>
           </p:cNvPr>
@@ -6143,14 +7012,14 @@
           <a:bodyPr/>
           <a:lstStyle/>
           <a:p>
-            <a:endParaRPr lang="en-GB"/>
+            <a:endParaRPr lang="en-GB" dirty="0"/>
           </a:p>
         </p:txBody>
       </p:sp>
     </p:spTree>
     <p:extLst>
       <p:ext uri="{BB962C8B-B14F-4D97-AF65-F5344CB8AC3E}">
-        <p14:creationId xmlns:p14="http://schemas.microsoft.com/office/powerpoint/2010/main" val="3454766599"/>
+        <p14:creationId xmlns:p14="http://schemas.microsoft.com/office/powerpoint/2010/main" val="1770287150"/>
       </p:ext>
     </p:extLst>
   </p:cSld>
@@ -6182,7 +7051,7 @@
           <p:cNvPr id="2" name="Title 1">
             <a:extLst>
               <a:ext uri="{FF2B5EF4-FFF2-40B4-BE49-F238E27FC236}">
-                <a16:creationId xmlns:a16="http://schemas.microsoft.com/office/drawing/2014/main" id="{B59DF5AC-A914-9BC6-B2DB-E233A0863519}"/>
+                <a16:creationId xmlns:a16="http://schemas.microsoft.com/office/drawing/2014/main" id="{9175B518-FAE9-0A40-A91A-3E5BFF0FA8F9}"/>
               </a:ext>
             </a:extLst>
           </p:cNvPr>
@@ -6200,7 +7069,7 @@
           <a:p>
             <a:r>
               <a:rPr lang="en-GB" dirty="0"/>
-              <a:t>Questions?</a:t>
+              <a:t>NBSVMs</a:t>
             </a:r>
           </a:p>
         </p:txBody>
@@ -6210,7 +7079,7 @@
           <p:cNvPr id="3" name="Content Placeholder 2">
             <a:extLst>
               <a:ext uri="{FF2B5EF4-FFF2-40B4-BE49-F238E27FC236}">
-                <a16:creationId xmlns:a16="http://schemas.microsoft.com/office/drawing/2014/main" id="{75D5C71D-ACE2-EB47-7F61-D3A227178340}"/>
+                <a16:creationId xmlns:a16="http://schemas.microsoft.com/office/drawing/2014/main" id="{CB68A4B8-4509-586C-2903-5AFC39567B9C}"/>
               </a:ext>
             </a:extLst>
           </p:cNvPr>
@@ -6233,7 +7102,7 @@
     </p:spTree>
     <p:extLst>
       <p:ext uri="{BB962C8B-B14F-4D97-AF65-F5344CB8AC3E}">
-        <p14:creationId xmlns:p14="http://schemas.microsoft.com/office/powerpoint/2010/main" val="534439601"/>
+        <p14:creationId xmlns:p14="http://schemas.microsoft.com/office/powerpoint/2010/main" val="3404685674"/>
       </p:ext>
     </p:extLst>
   </p:cSld>
@@ -6265,7 +7134,7 @@
           <p:cNvPr id="2" name="Title 1">
             <a:extLst>
               <a:ext uri="{FF2B5EF4-FFF2-40B4-BE49-F238E27FC236}">
-                <a16:creationId xmlns:a16="http://schemas.microsoft.com/office/drawing/2014/main" id="{8E3AFA9C-069F-28EF-AD4D-91F347FF33BF}"/>
+                <a16:creationId xmlns:a16="http://schemas.microsoft.com/office/drawing/2014/main" id="{EC24548F-1329-8849-338A-74AF83668B30}"/>
               </a:ext>
             </a:extLst>
           </p:cNvPr>
@@ -6281,7 +7150,10 @@
           <a:bodyPr/>
           <a:lstStyle/>
           <a:p>
-            <a:endParaRPr lang="en-GB"/>
+            <a:r>
+              <a:rPr lang="en-GB" dirty="0"/>
+              <a:t>GRUs</a:t>
+            </a:r>
           </a:p>
         </p:txBody>
       </p:sp>
@@ -6290,7 +7162,7 @@
           <p:cNvPr id="3" name="Content Placeholder 2">
             <a:extLst>
               <a:ext uri="{FF2B5EF4-FFF2-40B4-BE49-F238E27FC236}">
-                <a16:creationId xmlns:a16="http://schemas.microsoft.com/office/drawing/2014/main" id="{FE447CA2-A726-9377-AF4B-BB8D8CB87505}"/>
+                <a16:creationId xmlns:a16="http://schemas.microsoft.com/office/drawing/2014/main" id="{C6B676E7-0FB0-7088-CEA7-08DD7CDB9179}"/>
               </a:ext>
             </a:extLst>
           </p:cNvPr>
@@ -6313,7 +7185,7 @@
     </p:spTree>
     <p:extLst>
       <p:ext uri="{BB962C8B-B14F-4D97-AF65-F5344CB8AC3E}">
-        <p14:creationId xmlns:p14="http://schemas.microsoft.com/office/powerpoint/2010/main" val="1342558219"/>
+        <p14:creationId xmlns:p14="http://schemas.microsoft.com/office/powerpoint/2010/main" val="3471316294"/>
       </p:ext>
     </p:extLst>
   </p:cSld>
@@ -6345,7 +7217,7 @@
           <p:cNvPr id="2" name="Title 1">
             <a:extLst>
               <a:ext uri="{FF2B5EF4-FFF2-40B4-BE49-F238E27FC236}">
-                <a16:creationId xmlns:a16="http://schemas.microsoft.com/office/drawing/2014/main" id="{2C48047D-A525-9A2F-F642-161280D2620E}"/>
+                <a16:creationId xmlns:a16="http://schemas.microsoft.com/office/drawing/2014/main" id="{55808FFF-8FAF-4E95-5897-43AD9BC82CC6}"/>
               </a:ext>
             </a:extLst>
           </p:cNvPr>
@@ -6361,7 +7233,10 @@
           <a:bodyPr/>
           <a:lstStyle/>
           <a:p>
-            <a:endParaRPr lang="en-GB"/>
+            <a:r>
+              <a:rPr lang="en-GB" dirty="0"/>
+              <a:t>Transformers</a:t>
+            </a:r>
           </a:p>
         </p:txBody>
       </p:sp>
@@ -6370,7 +7245,7 @@
           <p:cNvPr id="3" name="Content Placeholder 2">
             <a:extLst>
               <a:ext uri="{FF2B5EF4-FFF2-40B4-BE49-F238E27FC236}">
-                <a16:creationId xmlns:a16="http://schemas.microsoft.com/office/drawing/2014/main" id="{7CEFCEEF-97C6-134B-724D-1CFFB8038532}"/>
+                <a16:creationId xmlns:a16="http://schemas.microsoft.com/office/drawing/2014/main" id="{B31D80C5-BD68-D0F7-4653-FA42FB31E914}"/>
               </a:ext>
             </a:extLst>
           </p:cNvPr>
@@ -6393,7 +7268,7 @@
     </p:spTree>
     <p:extLst>
       <p:ext uri="{BB962C8B-B14F-4D97-AF65-F5344CB8AC3E}">
-        <p14:creationId xmlns:p14="http://schemas.microsoft.com/office/powerpoint/2010/main" val="3883635782"/>
+        <p14:creationId xmlns:p14="http://schemas.microsoft.com/office/powerpoint/2010/main" val="2389514541"/>
       </p:ext>
     </p:extLst>
   </p:cSld>

</xml_diff>